<commit_message>
Update Lec 14 15
</commit_message>
<xml_diff>
--- a/Lectures/PyLec_15.pptx
+++ b/Lectures/PyLec_15.pptx
@@ -272,7 +272,7 @@
               <a:pPr>
                 <a:defRPr/>
               </a:pPr>
-              <a:t>03.02.2019</a:t>
+              <a:t>02.04.2019</a:t>
             </a:fld>
             <a:endParaRPr lang="ru-RU"/>
           </a:p>
@@ -459,7 +459,7 @@
               <a:pPr>
                 <a:defRPr/>
               </a:pPr>
-              <a:t>03.02.2019</a:t>
+              <a:t>02.04.2019</a:t>
             </a:fld>
             <a:endParaRPr lang="ru-RU"/>
           </a:p>
@@ -32024,13 +32024,31 @@
               <a:t>которые мы заполнили. </a:t>
             </a:r>
             <a:r>
-              <a:rPr lang="ru-RU" sz="2000" dirty="0" err="1">
+              <a:rPr lang="ru-RU" sz="2000" dirty="0" smtClean="0">
                 <a:solidFill>
                   <a:srgbClr val="002060"/>
                 </a:solidFill>
                 <a:latin typeface="Times New Roman" panose="02020603050405020304" pitchFamily="18" charset="0"/>
               </a:rPr>
-              <a:t>Соотвественно</a:t>
+              <a:t>Соотве</a:t>
+            </a:r>
+            <a:r>
+              <a:rPr lang="ru-RU" sz="2000" dirty="0">
+                <a:solidFill>
+                  <a:srgbClr val="002060"/>
+                </a:solidFill>
+                <a:latin typeface="Times New Roman" panose="02020603050405020304" pitchFamily="18" charset="0"/>
+              </a:rPr>
+              <a:t>т</a:t>
+            </a:r>
+            <a:r>
+              <a:rPr lang="ru-RU" sz="2000" dirty="0" smtClean="0">
+                <a:solidFill>
+                  <a:srgbClr val="002060"/>
+                </a:solidFill>
+                <a:latin typeface="Times New Roman" panose="02020603050405020304" pitchFamily="18" charset="0"/>
+              </a:rPr>
+              <a:t>ственно</a:t>
             </a:r>
             <a:r>
               <a:rPr lang="ru-RU" sz="2000" dirty="0">
@@ -39165,7 +39183,7 @@
               <a:t>: </a:t>
             </a:r>
             <a:r>
-              <a:rPr lang="en-US" sz="1400" b="1" smtClean="0">
+              <a:rPr lang="en-US" sz="1400" b="1" dirty="0" smtClean="0">
                 <a:solidFill>
                   <a:srgbClr val="000000"/>
                 </a:solidFill>

</xml_diff>